<commit_message>
fix: changed text in powerpoint file
</commit_message>
<xml_diff>
--- a/test/Presentation.pptx
+++ b/test/Presentation.pptx
@@ -120,7 +120,7 @@
 <file path=ppt/revisionInfo.xml><?xml version="1.0" encoding="utf-8"?>
 <p1510:revInfo xmlns:a="http://schemas.openxmlformats.org/drawingml/2006/main" xmlns:r="http://schemas.openxmlformats.org/officeDocument/2006/relationships" xmlns:p1510="http://schemas.microsoft.com/office/powerpoint/2015/10/main">
   <p1510:revLst>
-    <p1510:client id="{1BCCE584-3A3F-40FC-A47A-7A336D287367}" v="93" dt="2023-05-02T14:42:09.763"/>
+    <p1510:client id="{1BCCE584-3A3F-40FC-A47A-7A336D287367}" v="96" dt="2023-05-02T16:02:22.855"/>
   </p1510:revLst>
 </p1510:revInfo>
 </file>
@@ -3616,19 +3616,7 @@
               <a:rPr lang="en-US" dirty="0">
                 <a:cs typeface="Calibri Light"/>
               </a:rPr>
-              <a:t>This is a test </a:t>
-            </a:r>
-            <a:r>
-              <a:rPr lang="en-US" dirty="0" err="1">
-                <a:cs typeface="Calibri Light"/>
-              </a:rPr>
-              <a:t>pttx</a:t>
-            </a:r>
-            <a:r>
-              <a:rPr lang="en-US" dirty="0">
-                <a:cs typeface="Calibri Light"/>
-              </a:rPr>
-              <a:t> file</a:t>
+              <a:t>This is a test pptx file</a:t>
             </a:r>
             <a:endParaRPr lang="en-US" dirty="0"/>
           </a:p>

</xml_diff>